<commit_message>
Erzeugung der Datensätze Vorklassifikation
</commit_message>
<xml_diff>
--- a/Microsoft PowerPoint-Präsentation (neu).pptx
+++ b/Microsoft PowerPoint-Präsentation (neu).pptx
@@ -268,7 +268,7 @@
           <a:p>
             <a:fld id="{AC388E9C-BE03-4D12-9C2B-9D11FB1AF24E}" type="datetimeFigureOut">
               <a:rPr lang="de-DE" smtClean="0"/>
-              <a:t>04.08.2023</a:t>
+              <a:t>14.08.2023</a:t>
             </a:fld>
             <a:endParaRPr lang="de-DE"/>
           </a:p>
@@ -466,7 +466,7 @@
           <a:p>
             <a:fld id="{AC388E9C-BE03-4D12-9C2B-9D11FB1AF24E}" type="datetimeFigureOut">
               <a:rPr lang="de-DE" smtClean="0"/>
-              <a:t>04.08.2023</a:t>
+              <a:t>14.08.2023</a:t>
             </a:fld>
             <a:endParaRPr lang="de-DE"/>
           </a:p>
@@ -674,7 +674,7 @@
           <a:p>
             <a:fld id="{AC388E9C-BE03-4D12-9C2B-9D11FB1AF24E}" type="datetimeFigureOut">
               <a:rPr lang="de-DE" smtClean="0"/>
-              <a:t>04.08.2023</a:t>
+              <a:t>14.08.2023</a:t>
             </a:fld>
             <a:endParaRPr lang="de-DE"/>
           </a:p>
@@ -872,7 +872,7 @@
           <a:p>
             <a:fld id="{AC388E9C-BE03-4D12-9C2B-9D11FB1AF24E}" type="datetimeFigureOut">
               <a:rPr lang="de-DE" smtClean="0"/>
-              <a:t>04.08.2023</a:t>
+              <a:t>14.08.2023</a:t>
             </a:fld>
             <a:endParaRPr lang="de-DE"/>
           </a:p>
@@ -1147,7 +1147,7 @@
           <a:p>
             <a:fld id="{AC388E9C-BE03-4D12-9C2B-9D11FB1AF24E}" type="datetimeFigureOut">
               <a:rPr lang="de-DE" smtClean="0"/>
-              <a:t>04.08.2023</a:t>
+              <a:t>14.08.2023</a:t>
             </a:fld>
             <a:endParaRPr lang="de-DE"/>
           </a:p>
@@ -1412,7 +1412,7 @@
           <a:p>
             <a:fld id="{AC388E9C-BE03-4D12-9C2B-9D11FB1AF24E}" type="datetimeFigureOut">
               <a:rPr lang="de-DE" smtClean="0"/>
-              <a:t>04.08.2023</a:t>
+              <a:t>14.08.2023</a:t>
             </a:fld>
             <a:endParaRPr lang="de-DE"/>
           </a:p>
@@ -1824,7 +1824,7 @@
           <a:p>
             <a:fld id="{AC388E9C-BE03-4D12-9C2B-9D11FB1AF24E}" type="datetimeFigureOut">
               <a:rPr lang="de-DE" smtClean="0"/>
-              <a:t>04.08.2023</a:t>
+              <a:t>14.08.2023</a:t>
             </a:fld>
             <a:endParaRPr lang="de-DE"/>
           </a:p>
@@ -1965,7 +1965,7 @@
           <a:p>
             <a:fld id="{AC388E9C-BE03-4D12-9C2B-9D11FB1AF24E}" type="datetimeFigureOut">
               <a:rPr lang="de-DE" smtClean="0"/>
-              <a:t>04.08.2023</a:t>
+              <a:t>14.08.2023</a:t>
             </a:fld>
             <a:endParaRPr lang="de-DE"/>
           </a:p>
@@ -2078,7 +2078,7 @@
           <a:p>
             <a:fld id="{AC388E9C-BE03-4D12-9C2B-9D11FB1AF24E}" type="datetimeFigureOut">
               <a:rPr lang="de-DE" smtClean="0"/>
-              <a:t>04.08.2023</a:t>
+              <a:t>14.08.2023</a:t>
             </a:fld>
             <a:endParaRPr lang="de-DE"/>
           </a:p>
@@ -2389,7 +2389,7 @@
           <a:p>
             <a:fld id="{AC388E9C-BE03-4D12-9C2B-9D11FB1AF24E}" type="datetimeFigureOut">
               <a:rPr lang="de-DE" smtClean="0"/>
-              <a:t>04.08.2023</a:t>
+              <a:t>14.08.2023</a:t>
             </a:fld>
             <a:endParaRPr lang="de-DE"/>
           </a:p>
@@ -2677,7 +2677,7 @@
           <a:p>
             <a:fld id="{AC388E9C-BE03-4D12-9C2B-9D11FB1AF24E}" type="datetimeFigureOut">
               <a:rPr lang="de-DE" smtClean="0"/>
-              <a:t>04.08.2023</a:t>
+              <a:t>14.08.2023</a:t>
             </a:fld>
             <a:endParaRPr lang="de-DE"/>
           </a:p>
@@ -2918,7 +2918,7 @@
           <a:p>
             <a:fld id="{AC388E9C-BE03-4D12-9C2B-9D11FB1AF24E}" type="datetimeFigureOut">
               <a:rPr lang="de-DE" smtClean="0"/>
-              <a:t>04.08.2023</a:t>
+              <a:t>14.08.2023</a:t>
             </a:fld>
             <a:endParaRPr lang="de-DE"/>
           </a:p>
@@ -4117,6 +4117,80 @@
                 <a:srgbClr val="FF0000"/>
               </a:solidFill>
             </a:endParaRPr>
+          </a:p>
+        </p:txBody>
+      </p:sp>
+      <p:sp>
+        <p:nvSpPr>
+          <p:cNvPr id="2" name="Textfeld 1">
+            <a:extLst>
+              <a:ext uri="{FF2B5EF4-FFF2-40B4-BE49-F238E27FC236}">
+                <a16:creationId xmlns:a16="http://schemas.microsoft.com/office/drawing/2014/main" id="{DD0336E4-3001-902E-DBA4-9AF98A641847}"/>
+              </a:ext>
+            </a:extLst>
+          </p:cNvPr>
+          <p:cNvSpPr txBox="1"/>
+          <p:nvPr/>
+        </p:nvSpPr>
+        <p:spPr>
+          <a:xfrm rot="16200000">
+            <a:off x="397647" y="3348420"/>
+            <a:ext cx="2368081" cy="246221"/>
+          </a:xfrm>
+          <a:prstGeom prst="rect">
+            <a:avLst/>
+          </a:prstGeom>
+          <a:solidFill>
+            <a:schemeClr val="bg1"/>
+          </a:solidFill>
+        </p:spPr>
+        <p:txBody>
+          <a:bodyPr wrap="square" rtlCol="0">
+            <a:spAutoFit/>
+          </a:bodyPr>
+          <a:lstStyle/>
+          <a:p>
+            <a:r>
+              <a:rPr lang="de-DE" sz="1000" dirty="0"/>
+              <a:t>Standardabweichung der Geschwindigkeit</a:t>
+            </a:r>
+          </a:p>
+        </p:txBody>
+      </p:sp>
+      <p:sp>
+        <p:nvSpPr>
+          <p:cNvPr id="3" name="Textfeld 2">
+            <a:extLst>
+              <a:ext uri="{FF2B5EF4-FFF2-40B4-BE49-F238E27FC236}">
+                <a16:creationId xmlns:a16="http://schemas.microsoft.com/office/drawing/2014/main" id="{351B7C03-8448-EA96-EE8D-5855BD7E753B}"/>
+              </a:ext>
+            </a:extLst>
+          </p:cNvPr>
+          <p:cNvSpPr txBox="1"/>
+          <p:nvPr/>
+        </p:nvSpPr>
+        <p:spPr>
+          <a:xfrm rot="16200000">
+            <a:off x="4595504" y="3348420"/>
+            <a:ext cx="2368081" cy="246221"/>
+          </a:xfrm>
+          <a:prstGeom prst="rect">
+            <a:avLst/>
+          </a:prstGeom>
+          <a:solidFill>
+            <a:schemeClr val="bg1"/>
+          </a:solidFill>
+        </p:spPr>
+        <p:txBody>
+          <a:bodyPr wrap="square" rtlCol="0">
+            <a:spAutoFit/>
+          </a:bodyPr>
+          <a:lstStyle/>
+          <a:p>
+            <a:r>
+              <a:rPr lang="de-DE" sz="1000" dirty="0"/>
+              <a:t>Standardabweichung der Geschwindigkeit</a:t>
+            </a:r>
           </a:p>
         </p:txBody>
       </p:sp>

</xml_diff>

<commit_message>
Textuelle Überarbeitung bis Kap. 9
</commit_message>
<xml_diff>
--- a/Microsoft PowerPoint-Präsentation (neu).pptx
+++ b/Microsoft PowerPoint-Präsentation (neu).pptx
@@ -271,7 +271,7 @@
           <a:p>
             <a:fld id="{AC388E9C-BE03-4D12-9C2B-9D11FB1AF24E}" type="datetimeFigureOut">
               <a:rPr lang="de-DE" smtClean="0"/>
-              <a:t>25.08.2023</a:t>
+              <a:t>30.08.2023</a:t>
             </a:fld>
             <a:endParaRPr lang="de-DE"/>
           </a:p>
@@ -469,7 +469,7 @@
           <a:p>
             <a:fld id="{AC388E9C-BE03-4D12-9C2B-9D11FB1AF24E}" type="datetimeFigureOut">
               <a:rPr lang="de-DE" smtClean="0"/>
-              <a:t>25.08.2023</a:t>
+              <a:t>30.08.2023</a:t>
             </a:fld>
             <a:endParaRPr lang="de-DE"/>
           </a:p>
@@ -677,7 +677,7 @@
           <a:p>
             <a:fld id="{AC388E9C-BE03-4D12-9C2B-9D11FB1AF24E}" type="datetimeFigureOut">
               <a:rPr lang="de-DE" smtClean="0"/>
-              <a:t>25.08.2023</a:t>
+              <a:t>30.08.2023</a:t>
             </a:fld>
             <a:endParaRPr lang="de-DE"/>
           </a:p>
@@ -875,7 +875,7 @@
           <a:p>
             <a:fld id="{AC388E9C-BE03-4D12-9C2B-9D11FB1AF24E}" type="datetimeFigureOut">
               <a:rPr lang="de-DE" smtClean="0"/>
-              <a:t>25.08.2023</a:t>
+              <a:t>30.08.2023</a:t>
             </a:fld>
             <a:endParaRPr lang="de-DE"/>
           </a:p>
@@ -1150,7 +1150,7 @@
           <a:p>
             <a:fld id="{AC388E9C-BE03-4D12-9C2B-9D11FB1AF24E}" type="datetimeFigureOut">
               <a:rPr lang="de-DE" smtClean="0"/>
-              <a:t>25.08.2023</a:t>
+              <a:t>30.08.2023</a:t>
             </a:fld>
             <a:endParaRPr lang="de-DE"/>
           </a:p>
@@ -1415,7 +1415,7 @@
           <a:p>
             <a:fld id="{AC388E9C-BE03-4D12-9C2B-9D11FB1AF24E}" type="datetimeFigureOut">
               <a:rPr lang="de-DE" smtClean="0"/>
-              <a:t>25.08.2023</a:t>
+              <a:t>30.08.2023</a:t>
             </a:fld>
             <a:endParaRPr lang="de-DE"/>
           </a:p>
@@ -1827,7 +1827,7 @@
           <a:p>
             <a:fld id="{AC388E9C-BE03-4D12-9C2B-9D11FB1AF24E}" type="datetimeFigureOut">
               <a:rPr lang="de-DE" smtClean="0"/>
-              <a:t>25.08.2023</a:t>
+              <a:t>30.08.2023</a:t>
             </a:fld>
             <a:endParaRPr lang="de-DE"/>
           </a:p>
@@ -1968,7 +1968,7 @@
           <a:p>
             <a:fld id="{AC388E9C-BE03-4D12-9C2B-9D11FB1AF24E}" type="datetimeFigureOut">
               <a:rPr lang="de-DE" smtClean="0"/>
-              <a:t>25.08.2023</a:t>
+              <a:t>30.08.2023</a:t>
             </a:fld>
             <a:endParaRPr lang="de-DE"/>
           </a:p>
@@ -2081,7 +2081,7 @@
           <a:p>
             <a:fld id="{AC388E9C-BE03-4D12-9C2B-9D11FB1AF24E}" type="datetimeFigureOut">
               <a:rPr lang="de-DE" smtClean="0"/>
-              <a:t>25.08.2023</a:t>
+              <a:t>30.08.2023</a:t>
             </a:fld>
             <a:endParaRPr lang="de-DE"/>
           </a:p>
@@ -2392,7 +2392,7 @@
           <a:p>
             <a:fld id="{AC388E9C-BE03-4D12-9C2B-9D11FB1AF24E}" type="datetimeFigureOut">
               <a:rPr lang="de-DE" smtClean="0"/>
-              <a:t>25.08.2023</a:t>
+              <a:t>30.08.2023</a:t>
             </a:fld>
             <a:endParaRPr lang="de-DE"/>
           </a:p>
@@ -2680,7 +2680,7 @@
           <a:p>
             <a:fld id="{AC388E9C-BE03-4D12-9C2B-9D11FB1AF24E}" type="datetimeFigureOut">
               <a:rPr lang="de-DE" smtClean="0"/>
-              <a:t>25.08.2023</a:t>
+              <a:t>30.08.2023</a:t>
             </a:fld>
             <a:endParaRPr lang="de-DE"/>
           </a:p>
@@ -2921,7 +2921,7 @@
           <a:p>
             <a:fld id="{AC388E9C-BE03-4D12-9C2B-9D11FB1AF24E}" type="datetimeFigureOut">
               <a:rPr lang="de-DE" smtClean="0"/>
-              <a:t>25.08.2023</a:t>
+              <a:t>30.08.2023</a:t>
             </a:fld>
             <a:endParaRPr lang="de-DE"/>
           </a:p>
@@ -4227,77 +4227,6 @@
           <a:chExt cx="0" cy="0"/>
         </a:xfrm>
       </p:grpSpPr>
-      <p:pic>
-        <p:nvPicPr>
-          <p:cNvPr id="5" name="Grafik 4" descr="Ein Bild, das Text, Screenshot, Diagramm, Farbigkeit enthält.&#10;&#10;Automatisch generierte Beschreibung">
-            <a:extLst>
-              <a:ext uri="{FF2B5EF4-FFF2-40B4-BE49-F238E27FC236}">
-                <a16:creationId xmlns:a16="http://schemas.microsoft.com/office/drawing/2014/main" id="{B5DD01A1-25E3-0C3E-3E76-41683073B381}"/>
-              </a:ext>
-            </a:extLst>
-          </p:cNvPr>
-          <p:cNvPicPr>
-            <a:picLocks noChangeAspect="1"/>
-          </p:cNvPicPr>
-          <p:nvPr/>
-        </p:nvPicPr>
-        <p:blipFill>
-          <a:blip r:embed="rId2">
-            <a:extLst>
-              <a:ext uri="{28A0092B-C50C-407E-A947-70E740481C1C}">
-                <a14:useLocalDpi xmlns:a14="http://schemas.microsoft.com/office/drawing/2010/main" val="0"/>
-              </a:ext>
-            </a:extLst>
-          </a:blip>
-          <a:stretch>
-            <a:fillRect/>
-          </a:stretch>
-        </p:blipFill>
-        <p:spPr>
-          <a:xfrm>
-            <a:off x="315843" y="1348736"/>
-            <a:ext cx="5330963" cy="4160528"/>
-          </a:xfrm>
-          <a:prstGeom prst="rect">
-            <a:avLst/>
-          </a:prstGeom>
-        </p:spPr>
-      </p:pic>
-      <p:pic>
-        <p:nvPicPr>
-          <p:cNvPr id="7" name="Grafik 6" descr="Ein Bild, das Text, Screenshot, Farbigkeit, Diagramm enthält.&#10;&#10;Automatisch generierte Beschreibung">
-            <a:extLst>
-              <a:ext uri="{FF2B5EF4-FFF2-40B4-BE49-F238E27FC236}">
-                <a16:creationId xmlns:a16="http://schemas.microsoft.com/office/drawing/2014/main" id="{433853B9-737F-95C5-0C4B-4D3E485D7CF6}"/>
-              </a:ext>
-            </a:extLst>
-          </p:cNvPr>
-          <p:cNvPicPr>
-            <a:picLocks noChangeAspect="1"/>
-          </p:cNvPicPr>
-          <p:nvPr/>
-        </p:nvPicPr>
-        <p:blipFill rotWithShape="1">
-          <a:blip r:embed="rId3">
-            <a:extLst>
-              <a:ext uri="{28A0092B-C50C-407E-A947-70E740481C1C}">
-                <a14:useLocalDpi xmlns:a14="http://schemas.microsoft.com/office/drawing/2010/main" val="0"/>
-              </a:ext>
-            </a:extLst>
-          </a:blip>
-          <a:srcRect l="20869"/>
-          <a:stretch/>
-        </p:blipFill>
-        <p:spPr>
-          <a:xfrm>
-            <a:off x="4975653" y="1348736"/>
-            <a:ext cx="4659811" cy="4160528"/>
-          </a:xfrm>
-          <a:prstGeom prst="rect">
-            <a:avLst/>
-          </a:prstGeom>
-        </p:spPr>
-      </p:pic>
       <p:sp>
         <p:nvSpPr>
           <p:cNvPr id="9" name="Rechteck 8">
@@ -4640,6 +4569,76 @@
           </a:p>
         </p:txBody>
       </p:sp>
+      <p:pic>
+        <p:nvPicPr>
+          <p:cNvPr id="3" name="Grafik 2" descr="Ein Bild, das Screenshot, Text, Farbigkeit, Diagramm enthält.&#10;&#10;Automatisch generierte Beschreibung">
+            <a:extLst>
+              <a:ext uri="{FF2B5EF4-FFF2-40B4-BE49-F238E27FC236}">
+                <a16:creationId xmlns:a16="http://schemas.microsoft.com/office/drawing/2014/main" id="{00949712-4D47-C2B8-52A1-4534D87994C8}"/>
+              </a:ext>
+            </a:extLst>
+          </p:cNvPr>
+          <p:cNvPicPr>
+            <a:picLocks noChangeAspect="1"/>
+          </p:cNvPicPr>
+          <p:nvPr/>
+        </p:nvPicPr>
+        <p:blipFill rotWithShape="1">
+          <a:blip r:embed="rId2">
+            <a:extLst>
+              <a:ext uri="{28A0092B-C50C-407E-A947-70E740481C1C}">
+                <a14:useLocalDpi xmlns:a14="http://schemas.microsoft.com/office/drawing/2010/main" val="0"/>
+              </a:ext>
+            </a:extLst>
+          </a:blip>
+          <a:srcRect t="6761" r="13364"/>
+          <a:stretch/>
+        </p:blipFill>
+        <p:spPr>
+          <a:xfrm>
+            <a:off x="360037" y="1630026"/>
+            <a:ext cx="4475572" cy="3872066"/>
+          </a:xfrm>
+          <a:prstGeom prst="rect">
+            <a:avLst/>
+          </a:prstGeom>
+        </p:spPr>
+      </p:pic>
+      <p:pic>
+        <p:nvPicPr>
+          <p:cNvPr id="6" name="Grafik 5" descr="Ein Bild, das Screenshot, Text, Farbigkeit, Quadrat enthält.&#10;&#10;Automatisch generierte Beschreibung">
+            <a:extLst>
+              <a:ext uri="{FF2B5EF4-FFF2-40B4-BE49-F238E27FC236}">
+                <a16:creationId xmlns:a16="http://schemas.microsoft.com/office/drawing/2014/main" id="{C23754F3-F3E0-3C4C-BF11-1E8BE53986F4}"/>
+              </a:ext>
+            </a:extLst>
+          </p:cNvPr>
+          <p:cNvPicPr>
+            <a:picLocks noChangeAspect="1"/>
+          </p:cNvPicPr>
+          <p:nvPr/>
+        </p:nvPicPr>
+        <p:blipFill rotWithShape="1">
+          <a:blip r:embed="rId3">
+            <a:extLst>
+              <a:ext uri="{28A0092B-C50C-407E-A947-70E740481C1C}">
+                <a14:useLocalDpi xmlns:a14="http://schemas.microsoft.com/office/drawing/2010/main" val="0"/>
+              </a:ext>
+            </a:extLst>
+          </a:blip>
+          <a:srcRect l="20340" t="6933" r="1466"/>
+          <a:stretch/>
+        </p:blipFill>
+        <p:spPr>
+          <a:xfrm>
+            <a:off x="4964700" y="1644369"/>
+            <a:ext cx="4061257" cy="3872067"/>
+          </a:xfrm>
+          <a:prstGeom prst="rect">
+            <a:avLst/>
+          </a:prstGeom>
+        </p:spPr>
+      </p:pic>
     </p:spTree>
     <p:extLst>
       <p:ext uri="{BB962C8B-B14F-4D97-AF65-F5344CB8AC3E}">
@@ -4670,76 +4669,6 @@
           <a:chExt cx="0" cy="0"/>
         </a:xfrm>
       </p:grpSpPr>
-      <p:pic>
-        <p:nvPicPr>
-          <p:cNvPr id="12" name="Grafik 11" descr="Ein Bild, das Text, Screenshot, Diagramm, Farbigkeit enthält.&#10;&#10;Automatisch generierte Beschreibung">
-            <a:extLst>
-              <a:ext uri="{FF2B5EF4-FFF2-40B4-BE49-F238E27FC236}">
-                <a16:creationId xmlns:a16="http://schemas.microsoft.com/office/drawing/2014/main" id="{F9FDCD03-CF97-3DC1-34BB-29FF32150D47}"/>
-              </a:ext>
-            </a:extLst>
-          </p:cNvPr>
-          <p:cNvPicPr>
-            <a:picLocks noChangeAspect="1"/>
-          </p:cNvPicPr>
-          <p:nvPr/>
-        </p:nvPicPr>
-        <p:blipFill rotWithShape="1">
-          <a:blip r:embed="rId2">
-            <a:extLst>
-              <a:ext uri="{28A0092B-C50C-407E-A947-70E740481C1C}">
-                <a14:useLocalDpi xmlns:a14="http://schemas.microsoft.com/office/drawing/2010/main" val="0"/>
-              </a:ext>
-            </a:extLst>
-          </a:blip>
-          <a:srcRect l="21321" r="9524"/>
-          <a:stretch/>
-        </p:blipFill>
-        <p:spPr>
-          <a:xfrm>
-            <a:off x="5531833" y="1699583"/>
-            <a:ext cx="4143261" cy="4232943"/>
-          </a:xfrm>
-          <a:prstGeom prst="rect">
-            <a:avLst/>
-          </a:prstGeom>
-        </p:spPr>
-      </p:pic>
-      <p:pic>
-        <p:nvPicPr>
-          <p:cNvPr id="14" name="Grafik 13" descr="Ein Bild, das Text, Screenshot, Diagramm, Farbigkeit enthält.&#10;&#10;Automatisch generierte Beschreibung">
-            <a:extLst>
-              <a:ext uri="{FF2B5EF4-FFF2-40B4-BE49-F238E27FC236}">
-                <a16:creationId xmlns:a16="http://schemas.microsoft.com/office/drawing/2014/main" id="{EDAB397E-D3EC-D244-3286-5E572D2034BC}"/>
-              </a:ext>
-            </a:extLst>
-          </p:cNvPr>
-          <p:cNvPicPr>
-            <a:picLocks noChangeAspect="1"/>
-          </p:cNvPicPr>
-          <p:nvPr/>
-        </p:nvPicPr>
-        <p:blipFill rotWithShape="1">
-          <a:blip r:embed="rId3">
-            <a:extLst>
-              <a:ext uri="{28A0092B-C50C-407E-A947-70E740481C1C}">
-                <a14:useLocalDpi xmlns:a14="http://schemas.microsoft.com/office/drawing/2010/main" val="0"/>
-              </a:ext>
-            </a:extLst>
-          </a:blip>
-          <a:srcRect r="16261"/>
-          <a:stretch/>
-        </p:blipFill>
-        <p:spPr>
-          <a:xfrm>
-            <a:off x="833110" y="1699583"/>
-            <a:ext cx="4510657" cy="4196735"/>
-          </a:xfrm>
-          <a:prstGeom prst="rect">
-            <a:avLst/>
-          </a:prstGeom>
-        </p:spPr>
-      </p:pic>
       <p:sp>
         <p:nvSpPr>
           <p:cNvPr id="6" name="Rechteck 5">
@@ -4920,6 +4849,76 @@
           </a:p>
         </p:txBody>
       </p:sp>
+      <p:pic>
+        <p:nvPicPr>
+          <p:cNvPr id="3" name="Grafik 2" descr="Ein Bild, das Screenshot, Text, Farbigkeit, Diagramm enthält.&#10;&#10;Automatisch generierte Beschreibung">
+            <a:extLst>
+              <a:ext uri="{FF2B5EF4-FFF2-40B4-BE49-F238E27FC236}">
+                <a16:creationId xmlns:a16="http://schemas.microsoft.com/office/drawing/2014/main" id="{0F341660-E43D-41AC-BF5A-F2FE8A6DD19A}"/>
+              </a:ext>
+            </a:extLst>
+          </p:cNvPr>
+          <p:cNvPicPr>
+            <a:picLocks noChangeAspect="1"/>
+          </p:cNvPicPr>
+          <p:nvPr/>
+        </p:nvPicPr>
+        <p:blipFill rotWithShape="1">
+          <a:blip r:embed="rId2">
+            <a:extLst>
+              <a:ext uri="{28A0092B-C50C-407E-A947-70E740481C1C}">
+                <a14:useLocalDpi xmlns:a14="http://schemas.microsoft.com/office/drawing/2010/main" val="0"/>
+              </a:ext>
+            </a:extLst>
+          </a:blip>
+          <a:srcRect t="6668" r="13456"/>
+          <a:stretch/>
+        </p:blipFill>
+        <p:spPr>
+          <a:xfrm>
+            <a:off x="911811" y="2008544"/>
+            <a:ext cx="4510657" cy="3910502"/>
+          </a:xfrm>
+          <a:prstGeom prst="rect">
+            <a:avLst/>
+          </a:prstGeom>
+        </p:spPr>
+      </p:pic>
+      <p:pic>
+        <p:nvPicPr>
+          <p:cNvPr id="5" name="Grafik 4" descr="Ein Bild, das Screenshot, Text, Farbigkeit, Diagramm enthält.&#10;&#10;Automatisch generierte Beschreibung">
+            <a:extLst>
+              <a:ext uri="{FF2B5EF4-FFF2-40B4-BE49-F238E27FC236}">
+                <a16:creationId xmlns:a16="http://schemas.microsoft.com/office/drawing/2014/main" id="{5AA69D3A-7FB1-3E42-1A8C-64081655A219}"/>
+              </a:ext>
+            </a:extLst>
+          </p:cNvPr>
+          <p:cNvPicPr>
+            <a:picLocks noChangeAspect="1"/>
+          </p:cNvPicPr>
+          <p:nvPr/>
+        </p:nvPicPr>
+        <p:blipFill rotWithShape="1">
+          <a:blip r:embed="rId3">
+            <a:extLst>
+              <a:ext uri="{28A0092B-C50C-407E-A947-70E740481C1C}">
+                <a14:useLocalDpi xmlns:a14="http://schemas.microsoft.com/office/drawing/2010/main" val="0"/>
+              </a:ext>
+            </a:extLst>
+          </a:blip>
+          <a:srcRect l="20227" t="6533" r="1641"/>
+          <a:stretch/>
+        </p:blipFill>
+        <p:spPr>
+          <a:xfrm>
+            <a:off x="5544387" y="1995064"/>
+            <a:ext cx="4080758" cy="3910502"/>
+          </a:xfrm>
+          <a:prstGeom prst="rect">
+            <a:avLst/>
+          </a:prstGeom>
+        </p:spPr>
+      </p:pic>
     </p:spTree>
     <p:extLst>
       <p:ext uri="{BB962C8B-B14F-4D97-AF65-F5344CB8AC3E}">
@@ -4950,76 +4949,6 @@
           <a:chExt cx="0" cy="0"/>
         </a:xfrm>
       </p:grpSpPr>
-      <p:pic>
-        <p:nvPicPr>
-          <p:cNvPr id="11" name="Grafik 10" descr="Ein Bild, das Text, Screenshot, Diagramm, Farbigkeit enthält.&#10;&#10;Automatisch generierte Beschreibung">
-            <a:extLst>
-              <a:ext uri="{FF2B5EF4-FFF2-40B4-BE49-F238E27FC236}">
-                <a16:creationId xmlns:a16="http://schemas.microsoft.com/office/drawing/2014/main" id="{3A790D9C-336F-5AD0-88D1-41AA118C42CB}"/>
-              </a:ext>
-            </a:extLst>
-          </p:cNvPr>
-          <p:cNvPicPr>
-            <a:picLocks noChangeAspect="1"/>
-          </p:cNvPicPr>
-          <p:nvPr/>
-        </p:nvPicPr>
-        <p:blipFill rotWithShape="1">
-          <a:blip r:embed="rId2">
-            <a:extLst>
-              <a:ext uri="{28A0092B-C50C-407E-A947-70E740481C1C}">
-                <a14:useLocalDpi xmlns:a14="http://schemas.microsoft.com/office/drawing/2010/main" val="0"/>
-              </a:ext>
-            </a:extLst>
-          </a:blip>
-          <a:srcRect l="-680" t="-229" r="16212" b="229"/>
-          <a:stretch/>
-        </p:blipFill>
-        <p:spPr>
-          <a:xfrm>
-            <a:off x="1179097" y="1736686"/>
-            <a:ext cx="4510657" cy="4160528"/>
-          </a:xfrm>
-          <a:prstGeom prst="rect">
-            <a:avLst/>
-          </a:prstGeom>
-        </p:spPr>
-      </p:pic>
-      <p:pic>
-        <p:nvPicPr>
-          <p:cNvPr id="13" name="Grafik 12" descr="Ein Bild, das Text, Screenshot, Farbigkeit, Diagramm enthält.&#10;&#10;Automatisch generierte Beschreibung">
-            <a:extLst>
-              <a:ext uri="{FF2B5EF4-FFF2-40B4-BE49-F238E27FC236}">
-                <a16:creationId xmlns:a16="http://schemas.microsoft.com/office/drawing/2014/main" id="{000C3B24-B426-BEF7-B7DB-F558B003ABB3}"/>
-              </a:ext>
-            </a:extLst>
-          </p:cNvPr>
-          <p:cNvPicPr>
-            <a:picLocks noChangeAspect="1"/>
-          </p:cNvPicPr>
-          <p:nvPr/>
-        </p:nvPicPr>
-        <p:blipFill rotWithShape="1">
-          <a:blip r:embed="rId3">
-            <a:extLst>
-              <a:ext uri="{28A0092B-C50C-407E-A947-70E740481C1C}">
-                <a14:useLocalDpi xmlns:a14="http://schemas.microsoft.com/office/drawing/2010/main" val="0"/>
-              </a:ext>
-            </a:extLst>
-          </a:blip>
-          <a:srcRect l="21189" r="9744"/>
-          <a:stretch/>
-        </p:blipFill>
-        <p:spPr>
-          <a:xfrm>
-            <a:off x="5864799" y="1736686"/>
-            <a:ext cx="4067176" cy="4160528"/>
-          </a:xfrm>
-          <a:prstGeom prst="rect">
-            <a:avLst/>
-          </a:prstGeom>
-        </p:spPr>
-      </p:pic>
       <p:sp>
         <p:nvSpPr>
           <p:cNvPr id="6" name="Rechteck 5">
@@ -5146,6 +5075,76 @@
           </a:p>
         </p:txBody>
       </p:sp>
+      <p:pic>
+        <p:nvPicPr>
+          <p:cNvPr id="3" name="Grafik 2" descr="Ein Bild, das Screenshot, Text, Farbigkeit, Quadrat enthält.&#10;&#10;Automatisch generierte Beschreibung">
+            <a:extLst>
+              <a:ext uri="{FF2B5EF4-FFF2-40B4-BE49-F238E27FC236}">
+                <a16:creationId xmlns:a16="http://schemas.microsoft.com/office/drawing/2014/main" id="{ECD97D8A-21C2-C670-BD4E-0645C92A7A6E}"/>
+              </a:ext>
+            </a:extLst>
+          </p:cNvPr>
+          <p:cNvPicPr>
+            <a:picLocks noChangeAspect="1"/>
+          </p:cNvPicPr>
+          <p:nvPr/>
+        </p:nvPicPr>
+        <p:blipFill rotWithShape="1">
+          <a:blip r:embed="rId2">
+            <a:extLst>
+              <a:ext uri="{28A0092B-C50C-407E-A947-70E740481C1C}">
+                <a14:useLocalDpi xmlns:a14="http://schemas.microsoft.com/office/drawing/2010/main" val="0"/>
+              </a:ext>
+            </a:extLst>
+          </a:blip>
+          <a:srcRect t="6985" r="14210"/>
+          <a:stretch/>
+        </p:blipFill>
+        <p:spPr>
+          <a:xfrm>
+            <a:off x="1265035" y="2027280"/>
+            <a:ext cx="4510657" cy="3869934"/>
+          </a:xfrm>
+          <a:prstGeom prst="rect">
+            <a:avLst/>
+          </a:prstGeom>
+        </p:spPr>
+      </p:pic>
+      <p:pic>
+        <p:nvPicPr>
+          <p:cNvPr id="5" name="Grafik 4" descr="Ein Bild, das Text, Screenshot, Farbigkeit, Quadrat enthält.&#10;&#10;Automatisch generierte Beschreibung">
+            <a:extLst>
+              <a:ext uri="{FF2B5EF4-FFF2-40B4-BE49-F238E27FC236}">
+                <a16:creationId xmlns:a16="http://schemas.microsoft.com/office/drawing/2014/main" id="{C0C77302-B457-9E34-C20A-1B8A15939CE0}"/>
+              </a:ext>
+            </a:extLst>
+          </p:cNvPr>
+          <p:cNvPicPr>
+            <a:picLocks noChangeAspect="1"/>
+          </p:cNvPicPr>
+          <p:nvPr/>
+        </p:nvPicPr>
+        <p:blipFill rotWithShape="1">
+          <a:blip r:embed="rId3">
+            <a:extLst>
+              <a:ext uri="{28A0092B-C50C-407E-A947-70E740481C1C}">
+                <a14:useLocalDpi xmlns:a14="http://schemas.microsoft.com/office/drawing/2010/main" val="0"/>
+              </a:ext>
+            </a:extLst>
+          </a:blip>
+          <a:srcRect l="20075" t="6985" r="1429"/>
+          <a:stretch/>
+        </p:blipFill>
+        <p:spPr>
+          <a:xfrm>
+            <a:off x="5893925" y="2027280"/>
+            <a:ext cx="4127157" cy="3869934"/>
+          </a:xfrm>
+          <a:prstGeom prst="rect">
+            <a:avLst/>
+          </a:prstGeom>
+        </p:spPr>
+      </p:pic>
     </p:spTree>
     <p:extLst>
       <p:ext uri="{BB962C8B-B14F-4D97-AF65-F5344CB8AC3E}">
@@ -13352,8 +13351,8 @@
           </p:sp>
         </mc:Fallback>
       </mc:AlternateContent>
-      <mc:AlternateContent xmlns:mc="http://schemas.openxmlformats.org/markup-compatibility/2006">
-        <mc:Choice xmlns:a14="http://schemas.microsoft.com/office/drawing/2010/main" Requires="a14">
+      <mc:AlternateContent xmlns:mc="http://schemas.openxmlformats.org/markup-compatibility/2006" xmlns:a14="http://schemas.microsoft.com/office/drawing/2010/main">
+        <mc:Choice Requires="a14">
           <p:sp>
             <p:nvSpPr>
               <p:cNvPr id="11" name="Textfeld 10">
@@ -13404,7 +13403,7 @@
             </p:txBody>
           </p:sp>
         </mc:Choice>
-        <mc:Fallback>
+        <mc:Fallback xmlns="">
           <p:sp>
             <p:nvSpPr>
               <p:cNvPr id="11" name="Textfeld 10">
@@ -14980,8 +14979,8 @@
           </p:sp>
         </mc:Fallback>
       </mc:AlternateContent>
-      <mc:AlternateContent xmlns:mc="http://schemas.openxmlformats.org/markup-compatibility/2006">
-        <mc:Choice xmlns:a14="http://schemas.microsoft.com/office/drawing/2010/main" Requires="a14">
+      <mc:AlternateContent xmlns:mc="http://schemas.openxmlformats.org/markup-compatibility/2006" xmlns:a14="http://schemas.microsoft.com/office/drawing/2010/main">
+        <mc:Choice Requires="a14">
           <p:sp>
             <p:nvSpPr>
               <p:cNvPr id="8" name="Textfeld 7">
@@ -15039,7 +15038,7 @@
             </p:txBody>
           </p:sp>
         </mc:Choice>
-        <mc:Fallback>
+        <mc:Fallback xmlns="">
           <p:sp>
             <p:nvSpPr>
               <p:cNvPr id="8" name="Textfeld 7">
@@ -17784,8 +17783,8 @@
           </p:sp>
         </mc:Fallback>
       </mc:AlternateContent>
-      <mc:AlternateContent xmlns:mc="http://schemas.openxmlformats.org/markup-compatibility/2006">
-        <mc:Choice xmlns:a14="http://schemas.microsoft.com/office/drawing/2010/main" Requires="a14">
+      <mc:AlternateContent xmlns:mc="http://schemas.openxmlformats.org/markup-compatibility/2006" xmlns:a14="http://schemas.microsoft.com/office/drawing/2010/main">
+        <mc:Choice Requires="a14">
           <p:sp>
             <p:nvSpPr>
               <p:cNvPr id="4" name="Textfeld 3">
@@ -17843,7 +17842,7 @@
             </p:txBody>
           </p:sp>
         </mc:Choice>
-        <mc:Fallback>
+        <mc:Fallback xmlns="">
           <p:sp>
             <p:nvSpPr>
               <p:cNvPr id="4" name="Textfeld 3">
@@ -17888,8 +17887,8 @@
           </p:sp>
         </mc:Fallback>
       </mc:AlternateContent>
-      <mc:AlternateContent xmlns:mc="http://schemas.openxmlformats.org/markup-compatibility/2006">
-        <mc:Choice xmlns:a14="http://schemas.microsoft.com/office/drawing/2010/main" Requires="a14">
+      <mc:AlternateContent xmlns:mc="http://schemas.openxmlformats.org/markup-compatibility/2006" xmlns:a14="http://schemas.microsoft.com/office/drawing/2010/main">
+        <mc:Choice Requires="a14">
           <p:sp>
             <p:nvSpPr>
               <p:cNvPr id="9" name="Textfeld 8">
@@ -17947,7 +17946,7 @@
             </p:txBody>
           </p:sp>
         </mc:Choice>
-        <mc:Fallback>
+        <mc:Fallback xmlns="">
           <p:sp>
             <p:nvSpPr>
               <p:cNvPr id="9" name="Textfeld 8">
@@ -17992,8 +17991,8 @@
           </p:sp>
         </mc:Fallback>
       </mc:AlternateContent>
-      <mc:AlternateContent xmlns:mc="http://schemas.openxmlformats.org/markup-compatibility/2006">
-        <mc:Choice xmlns:a14="http://schemas.microsoft.com/office/drawing/2010/main" Requires="a14">
+      <mc:AlternateContent xmlns:mc="http://schemas.openxmlformats.org/markup-compatibility/2006" xmlns:a14="http://schemas.microsoft.com/office/drawing/2010/main">
+        <mc:Choice Requires="a14">
           <p:sp>
             <p:nvSpPr>
               <p:cNvPr id="10" name="Textfeld 9">
@@ -18051,7 +18050,7 @@
             </p:txBody>
           </p:sp>
         </mc:Choice>
-        <mc:Fallback>
+        <mc:Fallback xmlns="">
           <p:sp>
             <p:nvSpPr>
               <p:cNvPr id="10" name="Textfeld 9">

</xml_diff>

<commit_message>
Überarbeitung bis Kapitel 6
</commit_message>
<xml_diff>
--- a/Microsoft PowerPoint-Präsentation (neu).pptx
+++ b/Microsoft PowerPoint-Präsentation (neu).pptx
@@ -271,7 +271,7 @@
           <a:p>
             <a:fld id="{AC388E9C-BE03-4D12-9C2B-9D11FB1AF24E}" type="datetimeFigureOut">
               <a:rPr lang="de-DE" smtClean="0"/>
-              <a:t>30.08.2023</a:t>
+              <a:t>03.09.2023</a:t>
             </a:fld>
             <a:endParaRPr lang="de-DE"/>
           </a:p>
@@ -469,7 +469,7 @@
           <a:p>
             <a:fld id="{AC388E9C-BE03-4D12-9C2B-9D11FB1AF24E}" type="datetimeFigureOut">
               <a:rPr lang="de-DE" smtClean="0"/>
-              <a:t>30.08.2023</a:t>
+              <a:t>03.09.2023</a:t>
             </a:fld>
             <a:endParaRPr lang="de-DE"/>
           </a:p>
@@ -677,7 +677,7 @@
           <a:p>
             <a:fld id="{AC388E9C-BE03-4D12-9C2B-9D11FB1AF24E}" type="datetimeFigureOut">
               <a:rPr lang="de-DE" smtClean="0"/>
-              <a:t>30.08.2023</a:t>
+              <a:t>03.09.2023</a:t>
             </a:fld>
             <a:endParaRPr lang="de-DE"/>
           </a:p>
@@ -875,7 +875,7 @@
           <a:p>
             <a:fld id="{AC388E9C-BE03-4D12-9C2B-9D11FB1AF24E}" type="datetimeFigureOut">
               <a:rPr lang="de-DE" smtClean="0"/>
-              <a:t>30.08.2023</a:t>
+              <a:t>03.09.2023</a:t>
             </a:fld>
             <a:endParaRPr lang="de-DE"/>
           </a:p>
@@ -1150,7 +1150,7 @@
           <a:p>
             <a:fld id="{AC388E9C-BE03-4D12-9C2B-9D11FB1AF24E}" type="datetimeFigureOut">
               <a:rPr lang="de-DE" smtClean="0"/>
-              <a:t>30.08.2023</a:t>
+              <a:t>03.09.2023</a:t>
             </a:fld>
             <a:endParaRPr lang="de-DE"/>
           </a:p>
@@ -1415,7 +1415,7 @@
           <a:p>
             <a:fld id="{AC388E9C-BE03-4D12-9C2B-9D11FB1AF24E}" type="datetimeFigureOut">
               <a:rPr lang="de-DE" smtClean="0"/>
-              <a:t>30.08.2023</a:t>
+              <a:t>03.09.2023</a:t>
             </a:fld>
             <a:endParaRPr lang="de-DE"/>
           </a:p>
@@ -1827,7 +1827,7 @@
           <a:p>
             <a:fld id="{AC388E9C-BE03-4D12-9C2B-9D11FB1AF24E}" type="datetimeFigureOut">
               <a:rPr lang="de-DE" smtClean="0"/>
-              <a:t>30.08.2023</a:t>
+              <a:t>03.09.2023</a:t>
             </a:fld>
             <a:endParaRPr lang="de-DE"/>
           </a:p>
@@ -1968,7 +1968,7 @@
           <a:p>
             <a:fld id="{AC388E9C-BE03-4D12-9C2B-9D11FB1AF24E}" type="datetimeFigureOut">
               <a:rPr lang="de-DE" smtClean="0"/>
-              <a:t>30.08.2023</a:t>
+              <a:t>03.09.2023</a:t>
             </a:fld>
             <a:endParaRPr lang="de-DE"/>
           </a:p>
@@ -2081,7 +2081,7 @@
           <a:p>
             <a:fld id="{AC388E9C-BE03-4D12-9C2B-9D11FB1AF24E}" type="datetimeFigureOut">
               <a:rPr lang="de-DE" smtClean="0"/>
-              <a:t>30.08.2023</a:t>
+              <a:t>03.09.2023</a:t>
             </a:fld>
             <a:endParaRPr lang="de-DE"/>
           </a:p>
@@ -2392,7 +2392,7 @@
           <a:p>
             <a:fld id="{AC388E9C-BE03-4D12-9C2B-9D11FB1AF24E}" type="datetimeFigureOut">
               <a:rPr lang="de-DE" smtClean="0"/>
-              <a:t>30.08.2023</a:t>
+              <a:t>03.09.2023</a:t>
             </a:fld>
             <a:endParaRPr lang="de-DE"/>
           </a:p>
@@ -2680,7 +2680,7 @@
           <a:p>
             <a:fld id="{AC388E9C-BE03-4D12-9C2B-9D11FB1AF24E}" type="datetimeFigureOut">
               <a:rPr lang="de-DE" smtClean="0"/>
-              <a:t>30.08.2023</a:t>
+              <a:t>03.09.2023</a:t>
             </a:fld>
             <a:endParaRPr lang="de-DE"/>
           </a:p>
@@ -2921,7 +2921,7 @@
           <a:p>
             <a:fld id="{AC388E9C-BE03-4D12-9C2B-9D11FB1AF24E}" type="datetimeFigureOut">
               <a:rPr lang="de-DE" smtClean="0"/>
-              <a:t>30.08.2023</a:t>
+              <a:t>03.09.2023</a:t>
             </a:fld>
             <a:endParaRPr lang="de-DE"/>
           </a:p>
@@ -20578,8 +20578,8 @@
             </p:nvSpPr>
             <p:spPr>
               <a:xfrm>
-                <a:off x="9759978" y="1932973"/>
-                <a:ext cx="300788" cy="307777"/>
+                <a:off x="9801368" y="1929110"/>
+                <a:ext cx="211596" cy="307777"/>
               </a:xfrm>
               <a:prstGeom prst="rect">
                 <a:avLst/>
@@ -20599,31 +20599,12 @@
                       <m:jc m:val="centerGroup"/>
                     </m:oMathParaPr>
                     <m:oMath xmlns:m="http://schemas.openxmlformats.org/officeDocument/2006/math">
-                      <m:sSub>
-                        <m:sSubPr>
-                          <m:ctrlPr>
-                            <a:rPr lang="de-DE" sz="2000" b="1" i="1" smtClean="0">
-                              <a:latin typeface="Cambria Math" panose="02040503050406030204" pitchFamily="18" charset="0"/>
-                            </a:rPr>
-                          </m:ctrlPr>
-                        </m:sSubPr>
-                        <m:e>
-                          <m:r>
-                            <a:rPr lang="de-DE" sz="2000" b="1" i="1" smtClean="0">
-                              <a:latin typeface="Cambria Math" panose="02040503050406030204" pitchFamily="18" charset="0"/>
-                            </a:rPr>
-                            <m:t>𝒚</m:t>
-                          </m:r>
-                        </m:e>
-                        <m:sub>
-                          <m:r>
-                            <a:rPr lang="de-DE" sz="2000" b="1" i="1" smtClean="0">
-                              <a:latin typeface="Cambria Math" panose="02040503050406030204" pitchFamily="18" charset="0"/>
-                            </a:rPr>
-                            <m:t>𝒕</m:t>
-                          </m:r>
-                        </m:sub>
-                      </m:sSub>
+                      <m:r>
+                        <a:rPr lang="de-DE" sz="2000" b="1" i="1" dirty="0" smtClean="0">
+                          <a:latin typeface="Cambria Math" panose="02040503050406030204" pitchFamily="18" charset="0"/>
+                        </a:rPr>
+                        <m:t>𝒚</m:t>
+                      </m:r>
                     </m:oMath>
                   </m:oMathPara>
                 </a14:m>
@@ -20649,8 +20630,8 @@
             </p:nvSpPr>
             <p:spPr>
               <a:xfrm>
-                <a:off x="9759978" y="1932973"/>
-                <a:ext cx="300788" cy="307777"/>
+                <a:off x="9801368" y="1929110"/>
+                <a:ext cx="211596" cy="307777"/>
               </a:xfrm>
               <a:prstGeom prst="rect">
                 <a:avLst/>
@@ -20658,7 +20639,7 @@
               <a:blipFill>
                 <a:blip r:embed="rId11"/>
                 <a:stretch>
-                  <a:fillRect l="-20408" r="-8163" b="-25490"/>
+                  <a:fillRect l="-31429" r="-28571" b="-25490"/>
                 </a:stretch>
               </a:blipFill>
             </p:spPr>
@@ -20781,6 +20762,56 @@
               </a:rPr>
               <a:t>-Vector</a:t>
             </a:r>
+          </a:p>
+        </p:txBody>
+      </p:sp>
+      <p:sp>
+        <p:nvSpPr>
+          <p:cNvPr id="5" name="Rechteck: abgerundete Ecken 4">
+            <a:extLst>
+              <a:ext uri="{FF2B5EF4-FFF2-40B4-BE49-F238E27FC236}">
+                <a16:creationId xmlns:a16="http://schemas.microsoft.com/office/drawing/2014/main" id="{FA36EE66-DCD3-3A37-1A68-A918FF25E11A}"/>
+              </a:ext>
+            </a:extLst>
+          </p:cNvPr>
+          <p:cNvSpPr/>
+          <p:nvPr/>
+        </p:nvSpPr>
+        <p:spPr>
+          <a:xfrm>
+            <a:off x="1178352" y="1957531"/>
+            <a:ext cx="3344222" cy="279356"/>
+          </a:xfrm>
+          <a:prstGeom prst="roundRect">
+            <a:avLst/>
+          </a:prstGeom>
+          <a:noFill/>
+          <a:ln>
+            <a:prstDash val="dash"/>
+          </a:ln>
+        </p:spPr>
+        <p:style>
+          <a:lnRef idx="2">
+            <a:schemeClr val="accent1">
+              <a:shade val="15000"/>
+            </a:schemeClr>
+          </a:lnRef>
+          <a:fillRef idx="1">
+            <a:schemeClr val="accent1"/>
+          </a:fillRef>
+          <a:effectRef idx="0">
+            <a:schemeClr val="accent1"/>
+          </a:effectRef>
+          <a:fontRef idx="minor">
+            <a:schemeClr val="lt1"/>
+          </a:fontRef>
+        </p:style>
+        <p:txBody>
+          <a:bodyPr rtlCol="0" anchor="ctr"/>
+          <a:lstStyle/>
+          <a:p>
+            <a:pPr algn="ctr"/>
+            <a:endParaRPr lang="de-DE"/>
           </a:p>
         </p:txBody>
       </p:sp>
@@ -24091,6 +24122,192 @@
               </a:rPr>
               <a:t>3s</a:t>
             </a:r>
+          </a:p>
+        </p:txBody>
+      </p:sp>
+      <p:sp>
+        <p:nvSpPr>
+          <p:cNvPr id="2" name="Ellipse 1">
+            <a:extLst>
+              <a:ext uri="{FF2B5EF4-FFF2-40B4-BE49-F238E27FC236}">
+                <a16:creationId xmlns:a16="http://schemas.microsoft.com/office/drawing/2014/main" id="{03A7FE6B-056C-B5BF-2F22-C077F7A026B7}"/>
+              </a:ext>
+            </a:extLst>
+          </p:cNvPr>
+          <p:cNvSpPr/>
+          <p:nvPr/>
+        </p:nvSpPr>
+        <p:spPr>
+          <a:xfrm>
+            <a:off x="4820242" y="1655848"/>
+            <a:ext cx="131406" cy="131805"/>
+          </a:xfrm>
+          <a:prstGeom prst="ellipse">
+            <a:avLst/>
+          </a:prstGeom>
+          <a:noFill/>
+          <a:ln>
+            <a:noFill/>
+          </a:ln>
+        </p:spPr>
+        <p:style>
+          <a:lnRef idx="2">
+            <a:schemeClr val="accent1">
+              <a:shade val="15000"/>
+            </a:schemeClr>
+          </a:lnRef>
+          <a:fillRef idx="1">
+            <a:schemeClr val="accent1"/>
+          </a:fillRef>
+          <a:effectRef idx="0">
+            <a:schemeClr val="accent1"/>
+          </a:effectRef>
+          <a:fontRef idx="minor">
+            <a:schemeClr val="lt1"/>
+          </a:fontRef>
+        </p:style>
+        <p:txBody>
+          <a:bodyPr rtlCol="0" anchor="ctr"/>
+          <a:lstStyle/>
+          <a:p>
+            <a:pPr algn="ctr"/>
+            <a:r>
+              <a:rPr lang="de-DE" sz="1050" dirty="0">
+                <a:solidFill>
+                  <a:sysClr val="windowText" lastClr="000000"/>
+                </a:solidFill>
+              </a:rPr>
+              <a:t>2</a:t>
+            </a:r>
+            <a:endParaRPr lang="de-DE" sz="1400" dirty="0">
+              <a:solidFill>
+                <a:sysClr val="windowText" lastClr="000000"/>
+              </a:solidFill>
+            </a:endParaRPr>
+          </a:p>
+        </p:txBody>
+      </p:sp>
+      <p:sp>
+        <p:nvSpPr>
+          <p:cNvPr id="3" name="Ellipse 2">
+            <a:extLst>
+              <a:ext uri="{FF2B5EF4-FFF2-40B4-BE49-F238E27FC236}">
+                <a16:creationId xmlns:a16="http://schemas.microsoft.com/office/drawing/2014/main" id="{7F5173E5-1316-83BB-B349-98D35201569A}"/>
+              </a:ext>
+            </a:extLst>
+          </p:cNvPr>
+          <p:cNvSpPr/>
+          <p:nvPr/>
+        </p:nvSpPr>
+        <p:spPr>
+          <a:xfrm>
+            <a:off x="5368225" y="1654184"/>
+            <a:ext cx="131406" cy="131805"/>
+          </a:xfrm>
+          <a:prstGeom prst="ellipse">
+            <a:avLst/>
+          </a:prstGeom>
+          <a:noFill/>
+          <a:ln>
+            <a:noFill/>
+          </a:ln>
+        </p:spPr>
+        <p:style>
+          <a:lnRef idx="2">
+            <a:schemeClr val="accent1">
+              <a:shade val="15000"/>
+            </a:schemeClr>
+          </a:lnRef>
+          <a:fillRef idx="1">
+            <a:schemeClr val="accent1"/>
+          </a:fillRef>
+          <a:effectRef idx="0">
+            <a:schemeClr val="accent1"/>
+          </a:effectRef>
+          <a:fontRef idx="minor">
+            <a:schemeClr val="lt1"/>
+          </a:fontRef>
+        </p:style>
+        <p:txBody>
+          <a:bodyPr rtlCol="0" anchor="ctr"/>
+          <a:lstStyle/>
+          <a:p>
+            <a:pPr algn="ctr"/>
+            <a:r>
+              <a:rPr lang="de-DE" sz="1050" dirty="0">
+                <a:solidFill>
+                  <a:sysClr val="windowText" lastClr="000000"/>
+                </a:solidFill>
+              </a:rPr>
+              <a:t>4</a:t>
+            </a:r>
+            <a:endParaRPr lang="de-DE" sz="1400" dirty="0">
+              <a:solidFill>
+                <a:sysClr val="windowText" lastClr="000000"/>
+              </a:solidFill>
+            </a:endParaRPr>
+          </a:p>
+        </p:txBody>
+      </p:sp>
+      <p:sp>
+        <p:nvSpPr>
+          <p:cNvPr id="4" name="Ellipse 3">
+            <a:extLst>
+              <a:ext uri="{FF2B5EF4-FFF2-40B4-BE49-F238E27FC236}">
+                <a16:creationId xmlns:a16="http://schemas.microsoft.com/office/drawing/2014/main" id="{736738FA-242F-A27A-EB5B-8DC7E6C29508}"/>
+              </a:ext>
+            </a:extLst>
+          </p:cNvPr>
+          <p:cNvSpPr/>
+          <p:nvPr/>
+        </p:nvSpPr>
+        <p:spPr>
+          <a:xfrm>
+            <a:off x="5720804" y="1639789"/>
+            <a:ext cx="533985" cy="159795"/>
+          </a:xfrm>
+          <a:prstGeom prst="ellipse">
+            <a:avLst/>
+          </a:prstGeom>
+          <a:noFill/>
+          <a:ln>
+            <a:noFill/>
+          </a:ln>
+        </p:spPr>
+        <p:style>
+          <a:lnRef idx="2">
+            <a:schemeClr val="accent1">
+              <a:shade val="15000"/>
+            </a:schemeClr>
+          </a:lnRef>
+          <a:fillRef idx="1">
+            <a:schemeClr val="accent1"/>
+          </a:fillRef>
+          <a:effectRef idx="0">
+            <a:schemeClr val="accent1"/>
+          </a:effectRef>
+          <a:fontRef idx="minor">
+            <a:schemeClr val="lt1"/>
+          </a:fontRef>
+        </p:style>
+        <p:txBody>
+          <a:bodyPr rtlCol="0" anchor="ctr"/>
+          <a:lstStyle/>
+          <a:p>
+            <a:pPr algn="ctr"/>
+            <a:r>
+              <a:rPr lang="de-DE" sz="1050" dirty="0">
+                <a:solidFill>
+                  <a:sysClr val="windowText" lastClr="000000"/>
+                </a:solidFill>
+              </a:rPr>
+              <a:t>6,7</a:t>
+            </a:r>
+            <a:endParaRPr lang="de-DE" sz="1400" dirty="0">
+              <a:solidFill>
+                <a:sysClr val="windowText" lastClr="000000"/>
+              </a:solidFill>
+            </a:endParaRPr>
           </a:p>
         </p:txBody>
       </p:sp>

</xml_diff>